<commit_message>
A review of our analysis
Key insights and takeaways, and information regarding the team members, project stages and the dataset.
</commit_message>
<xml_diff>
--- a/nft.pptx
+++ b/nft.pptx
@@ -260,7 +260,7 @@
       <p15:sldGuideLst xmlns:p15="http://schemas.microsoft.com/office/powerpoint/2012/main"/>
     </p:ext>
     <p:ext uri="http://customooxmlschemas.google.com/">
-      <go:slidesCustomData xmlns="" xmlns:mc="http://schemas.openxmlformats.org/markup-compatibility/2006" xmlns:mv="urn:schemas-microsoft-com:mac:vml" xmlns:c="http://schemas.openxmlformats.org/drawingml/2006/chart" xmlns:dgm="http://schemas.openxmlformats.org/drawingml/2006/diagram" xmlns:o="urn:schemas-microsoft-com:office:office" xmlns:v="urn:schemas-microsoft-com:vml" xmlns:pvml="urn:schemas-microsoft-com:office:powerpoint" xmlns:com="http://schemas.openxmlformats.org/drawingml/2006/compatibility" xmlns:p14="http://schemas.microsoft.com/office/powerpoint/2010/main" xmlns:p15="http://schemas.microsoft.com/office/powerpoint/2012/main" xmlns:ahyp="http://schemas.microsoft.com/office/drawing/2018/hyperlinkcolor" xmlns:go="http://customooxmlschemas.google.com/" r:id="rId18" roundtripDataSignature="AMtx7mhf1v5hIWU5vCkQ/NwHj6AI7p9qPQ=="/>
+      <go:slidesCustomData xmlns:go="http://customooxmlschemas.google.com/" xmlns:ahyp="http://schemas.microsoft.com/office/drawing/2018/hyperlinkcolor" xmlns:p15="http://schemas.microsoft.com/office/powerpoint/2012/main" xmlns:p14="http://schemas.microsoft.com/office/powerpoint/2010/main" xmlns:com="http://schemas.openxmlformats.org/drawingml/2006/compatibility" xmlns:pvml="urn:schemas-microsoft-com:office:powerpoint" xmlns:v="urn:schemas-microsoft-com:vml" xmlns:o="urn:schemas-microsoft-com:office:office" xmlns:dgm="http://schemas.openxmlformats.org/drawingml/2006/diagram" xmlns:c="http://schemas.openxmlformats.org/drawingml/2006/chart" xmlns:mv="urn:schemas-microsoft-com:mac:vml" xmlns:mc="http://schemas.openxmlformats.org/markup-compatibility/2006" xmlns="" r:id="rId18" roundtripDataSignature="AMtx7mhf1v5hIWU5vCkQ/NwHj6AI7p9qPQ=="/>
     </p:ext>
   </p:extLst>
 </p:presentation>
@@ -14956,6 +14956,18 @@
               <a:buSzPts val="2400"/>
             </a:pPr>
             <a:r>
+              <a:rPr lang="en-US" sz="1800">
+                <a:solidFill>
+                  <a:srgbClr val="434343"/>
+                </a:solidFill>
+                <a:latin typeface="Calibri" panose="020F0502020204030204" pitchFamily="34" charset="0"/>
+                <a:ea typeface="Calibri"/>
+                <a:cs typeface="Calibri" panose="020F0502020204030204" pitchFamily="34" charset="0"/>
+                <a:sym typeface="Calibri"/>
+              </a:rPr>
+              <a:t>Both mints’ and transfers’ </a:t>
+            </a:r>
+            <a:r>
               <a:rPr lang="en-US" sz="1800" dirty="0">
                 <a:solidFill>
                   <a:srgbClr val="434343"/>
@@ -14965,7 +14977,7 @@
                 <a:cs typeface="Calibri" panose="020F0502020204030204" pitchFamily="34" charset="0"/>
                 <a:sym typeface="Calibri"/>
               </a:rPr>
-              <a:t>Both mints and transfers strongest hour of the day is 22:00.</a:t>
+              <a:t>strongest hour of the day is 22:00.</a:t>
             </a:r>
           </a:p>
           <a:p>

</xml_diff>